<commit_message>
check in local updates
</commit_message>
<xml_diff>
--- a/figure/cgc-fsm.pptx
+++ b/figure/cgc-fsm.pptx
@@ -3366,7 +3366,7 @@
         </p:nvSpPr>
         <p:spPr>
           <a:xfrm>
-            <a:off x="352897" y="3725948"/>
+            <a:off x="406473" y="3722106"/>
             <a:ext cx="1828800" cy="577516"/>
           </a:xfrm>
           <a:prstGeom prst="ellipse">
@@ -3416,7 +3416,7 @@
         </p:nvSpPr>
         <p:spPr>
           <a:xfrm>
-            <a:off x="934257" y="3814651"/>
+            <a:off x="987833" y="3810809"/>
             <a:ext cx="666080" cy="400110"/>
           </a:xfrm>
           <a:prstGeom prst="rect">
@@ -3449,17 +3449,17 @@
         </p:nvCxnSpPr>
         <p:spPr>
           <a:xfrm>
-            <a:off x="2181697" y="4014706"/>
-            <a:ext cx="1018703" cy="0"/>
+            <a:off x="2235273" y="4010864"/>
+            <a:ext cx="965127" cy="3842"/>
           </a:xfrm>
           <a:prstGeom prst="straightConnector1">
             <a:avLst/>
           </a:prstGeom>
-          <a:ln w="22225">
+          <a:ln w="25400">
             <a:solidFill>
               <a:schemeClr val="tx1"/>
             </a:solidFill>
-            <a:tailEnd type="arrow"/>
+            <a:tailEnd type="arrow" w="lg" len="lg"/>
           </a:ln>
         </p:spPr>
         <p:style>
@@ -3485,7 +3485,7 @@
         </p:nvSpPr>
         <p:spPr>
           <a:xfrm>
-            <a:off x="4901967" y="5328489"/>
+            <a:off x="6348640" y="5278437"/>
             <a:ext cx="1828800" cy="577516"/>
           </a:xfrm>
           <a:prstGeom prst="ellipse">
@@ -3535,7 +3535,7 @@
         </p:nvSpPr>
         <p:spPr>
           <a:xfrm>
-            <a:off x="5483327" y="5417192"/>
+            <a:off x="6930000" y="5367140"/>
             <a:ext cx="712759" cy="400110"/>
           </a:xfrm>
           <a:prstGeom prst="rect">
@@ -3645,7 +3645,7 @@
         </p:nvSpPr>
         <p:spPr>
           <a:xfrm>
-            <a:off x="7863490" y="3725948"/>
+            <a:off x="6371584" y="3725948"/>
             <a:ext cx="1828800" cy="577516"/>
           </a:xfrm>
           <a:prstGeom prst="ellipse">
@@ -3695,7 +3695,7 @@
         </p:nvSpPr>
         <p:spPr>
           <a:xfrm>
-            <a:off x="8198083" y="3814651"/>
+            <a:off x="6706177" y="3814651"/>
             <a:ext cx="1159613" cy="400110"/>
           </a:xfrm>
           <a:prstGeom prst="rect">
@@ -3710,11 +3710,11 @@
           <a:lstStyle/>
           <a:p>
             <a:r>
-              <a:rPr lang="en-US" sz="2000" smtClean="0"/>
+              <a:rPr lang="en-US" sz="2000" dirty="0" err="1" smtClean="0"/>
               <a:t>close</a:t>
             </a:r>
             <a:r>
-              <a:rPr lang="en-US" sz="2000" smtClean="0"/>
+              <a:rPr lang="en-US" sz="2000" dirty="0" err="1" smtClean="0"/>
               <a:t>_set</a:t>
             </a:r>
             <a:endParaRPr lang="en-US" sz="2000" dirty="0"/>
@@ -3729,7 +3729,7 @@
         </p:nvSpPr>
         <p:spPr>
           <a:xfrm>
-            <a:off x="3988319" y="1485350"/>
+            <a:off x="3195203" y="2107142"/>
             <a:ext cx="1828800" cy="577516"/>
           </a:xfrm>
           <a:prstGeom prst="ellipse">
@@ -3779,7 +3779,7 @@
         </p:nvSpPr>
         <p:spPr>
           <a:xfrm>
-            <a:off x="4117087" y="1574053"/>
+            <a:off x="3323971" y="2195845"/>
             <a:ext cx="1571264" cy="400110"/>
           </a:xfrm>
           <a:prstGeom prst="rect">
@@ -3809,7 +3809,7 @@
         </p:nvSpPr>
         <p:spPr>
           <a:xfrm>
-            <a:off x="6876288" y="1481328"/>
+            <a:off x="6370002" y="2103120"/>
             <a:ext cx="1828800" cy="577516"/>
           </a:xfrm>
           <a:prstGeom prst="ellipse">
@@ -3859,7 +3859,7 @@
         </p:nvSpPr>
         <p:spPr>
           <a:xfrm>
-            <a:off x="7005056" y="1574053"/>
+            <a:off x="6498770" y="2191823"/>
             <a:ext cx="1571264" cy="400110"/>
           </a:xfrm>
           <a:prstGeom prst="rect">
@@ -3874,11 +3874,11 @@
           <a:lstStyle/>
           <a:p>
             <a:r>
-              <a:rPr lang="en-US" sz="2000" smtClean="0"/>
+              <a:rPr lang="en-US" sz="2000" dirty="0" err="1" smtClean="0"/>
               <a:t>close</a:t>
             </a:r>
             <a:r>
-              <a:rPr lang="en-US" sz="2000" smtClean="0"/>
+              <a:rPr lang="en-US" sz="2000" dirty="0" err="1" smtClean="0"/>
               <a:t>_double</a:t>
             </a:r>
             <a:endParaRPr lang="en-US" sz="2000" dirty="0"/>
@@ -3893,8 +3893,8 @@
         </p:nvSpPr>
         <p:spPr>
           <a:xfrm>
-            <a:off x="2528824" y="3444128"/>
-            <a:ext cx="330540" cy="461665"/>
+            <a:off x="2576603" y="3538728"/>
+            <a:ext cx="293670" cy="369332"/>
           </a:xfrm>
           <a:prstGeom prst="rect">
             <a:avLst/>
@@ -3908,10 +3908,10 @@
           <a:lstStyle/>
           <a:p>
             <a:r>
-              <a:rPr lang="en-US" sz="2400" b="1" dirty="0" smtClean="0"/>
+              <a:rPr lang="en-US" b="1" dirty="0" smtClean="0"/>
               <a:t>|</a:t>
             </a:r>
-            <a:endParaRPr lang="en-US" sz="2400" b="1" dirty="0"/>
+            <a:endParaRPr lang="en-US" b="1" dirty="0"/>
           </a:p>
         </p:txBody>
       </p:sp>
@@ -3927,16 +3927,16 @@
         <p:spPr>
           <a:xfrm>
             <a:off x="5029200" y="4014706"/>
-            <a:ext cx="2834290" cy="0"/>
+            <a:ext cx="1342384" cy="0"/>
           </a:xfrm>
           <a:prstGeom prst="straightConnector1">
             <a:avLst/>
           </a:prstGeom>
-          <a:ln w="22225">
+          <a:ln w="25400">
             <a:solidFill>
               <a:schemeClr val="tx1"/>
             </a:solidFill>
-            <a:tailEnd type="arrow"/>
+            <a:tailEnd type="arrow" w="lg" len="lg"/>
           </a:ln>
         </p:spPr>
         <p:style>
@@ -3962,8 +3962,8 @@
         </p:nvSpPr>
         <p:spPr>
           <a:xfrm>
-            <a:off x="6228096" y="3495115"/>
-            <a:ext cx="330540" cy="461665"/>
+            <a:off x="5565466" y="3537988"/>
+            <a:ext cx="293670" cy="369332"/>
           </a:xfrm>
           <a:prstGeom prst="rect">
             <a:avLst/>
@@ -3977,10 +3977,10 @@
           <a:lstStyle/>
           <a:p>
             <a:r>
-              <a:rPr lang="en-US" sz="2400" b="1" dirty="0" smtClean="0"/>
+              <a:rPr lang="en-US" b="1" dirty="0" smtClean="0"/>
               <a:t>|</a:t>
             </a:r>
-            <a:endParaRPr lang="en-US" sz="2400" b="1" dirty="0"/>
+            <a:endParaRPr lang="en-US" b="1" dirty="0"/>
           </a:p>
         </p:txBody>
       </p:sp>
@@ -3994,18 +3994,18 @@
           <p:nvPr/>
         </p:nvCxnSpPr>
         <p:spPr>
-          <a:xfrm flipV="1">
-            <a:off x="4114800" y="2062866"/>
-            <a:ext cx="787919" cy="1663082"/>
+          <a:xfrm flipH="1" flipV="1">
+            <a:off x="4109603" y="2684658"/>
+            <a:ext cx="5197" cy="1041290"/>
           </a:xfrm>
           <a:prstGeom prst="straightConnector1">
             <a:avLst/>
           </a:prstGeom>
-          <a:ln w="22225">
+          <a:ln w="25400">
             <a:solidFill>
               <a:schemeClr val="tx1"/>
             </a:solidFill>
-            <a:tailEnd type="arrow"/>
+            <a:tailEnd type="arrow" w="lg" len="lg"/>
           </a:ln>
         </p:spPr>
         <p:style>
@@ -4031,8 +4031,8 @@
         </p:nvSpPr>
         <p:spPr>
           <a:xfrm>
-            <a:off x="3570201" y="2658346"/>
-            <a:ext cx="319318" cy="461665"/>
+            <a:off x="3541730" y="3020637"/>
+            <a:ext cx="285656" cy="369332"/>
           </a:xfrm>
           <a:prstGeom prst="rect">
             <a:avLst/>
@@ -4046,10 +4046,10 @@
           <a:lstStyle/>
           <a:p>
             <a:r>
-              <a:rPr lang="en-US" sz="2400" b="1" dirty="0" smtClean="0"/>
+              <a:rPr lang="en-US" b="1" dirty="0" smtClean="0"/>
               <a:t>“</a:t>
             </a:r>
-            <a:endParaRPr lang="en-US" sz="2400" b="1" dirty="0"/>
+            <a:endParaRPr lang="en-US" b="1" dirty="0"/>
           </a:p>
         </p:txBody>
       </p:sp>
@@ -4064,17 +4064,17 @@
         </p:nvCxnSpPr>
         <p:spPr>
           <a:xfrm flipV="1">
-            <a:off x="5817119" y="1770086"/>
-            <a:ext cx="1059169" cy="4022"/>
+            <a:off x="5024003" y="2391878"/>
+            <a:ext cx="1345999" cy="4022"/>
           </a:xfrm>
           <a:prstGeom prst="straightConnector1">
             <a:avLst/>
           </a:prstGeom>
-          <a:ln w="22225">
+          <a:ln w="25400">
             <a:solidFill>
               <a:schemeClr val="tx1"/>
             </a:solidFill>
-            <a:tailEnd type="arrow"/>
+            <a:tailEnd type="arrow" w="lg" len="lg"/>
           </a:ln>
         </p:spPr>
         <p:style>
@@ -4100,8 +4100,8 @@
         </p:nvSpPr>
         <p:spPr>
           <a:xfrm>
-            <a:off x="6170229" y="1258874"/>
-            <a:ext cx="319318" cy="461665"/>
+            <a:off x="5552814" y="1931154"/>
+            <a:ext cx="285656" cy="369332"/>
           </a:xfrm>
           <a:prstGeom prst="rect">
             <a:avLst/>
@@ -4115,10 +4115,10 @@
           <a:lstStyle/>
           <a:p>
             <a:r>
-              <a:rPr lang="en-US" sz="2400" b="1" dirty="0" smtClean="0"/>
+              <a:rPr lang="en-US" b="1" dirty="0" smtClean="0"/>
               <a:t>”</a:t>
             </a:r>
-            <a:endParaRPr lang="en-US" sz="2400" b="1" dirty="0"/>
+            <a:endParaRPr lang="en-US" b="1" dirty="0"/>
           </a:p>
         </p:txBody>
       </p:sp>
@@ -4133,17 +4133,17 @@
         </p:nvCxnSpPr>
         <p:spPr>
           <a:xfrm>
-            <a:off x="7790688" y="2058844"/>
-            <a:ext cx="987202" cy="1667104"/>
+            <a:off x="7284402" y="2680636"/>
+            <a:ext cx="1582" cy="1045312"/>
           </a:xfrm>
           <a:prstGeom prst="straightConnector1">
             <a:avLst/>
           </a:prstGeom>
-          <a:ln w="22225">
+          <a:ln w="25400">
             <a:solidFill>
               <a:schemeClr val="tx1"/>
             </a:solidFill>
-            <a:tailEnd type="arrow"/>
+            <a:tailEnd type="arrow" w="lg" len="lg"/>
           </a:ln>
         </p:spPr>
         <p:style>
@@ -4163,14 +4163,14 @@
       </p:cxnSp>
       <p:sp>
         <p:nvSpPr>
-          <p:cNvPr id="84" name="TextBox 83"/>
+          <p:cNvPr id="90" name="TextBox 89"/>
           <p:cNvSpPr txBox="1"/>
           <p:nvPr/>
         </p:nvSpPr>
         <p:spPr>
           <a:xfrm>
-            <a:off x="8484276" y="2524750"/>
-            <a:ext cx="330540" cy="461665"/>
+            <a:off x="6783165" y="3018626"/>
+            <a:ext cx="293670" cy="369332"/>
           </a:xfrm>
           <a:prstGeom prst="rect">
             <a:avLst/>
@@ -4184,13 +4184,173 @@
           <a:lstStyle/>
           <a:p>
             <a:r>
-              <a:rPr lang="en-US" sz="2400" b="1" dirty="0" smtClean="0"/>
+              <a:rPr lang="en-US" b="1" dirty="0" smtClean="0"/>
               <a:t>|</a:t>
             </a:r>
-            <a:endParaRPr lang="en-US" sz="2400" b="1" dirty="0"/>
-          </a:p>
-        </p:txBody>
-      </p:sp>
+            <a:endParaRPr lang="en-US" b="1" dirty="0"/>
+          </a:p>
+        </p:txBody>
+      </p:sp>
+      <p:cxnSp>
+        <p:nvCxnSpPr>
+          <p:cNvPr id="49" name="Curved Connector 48"/>
+          <p:cNvCxnSpPr>
+            <a:stCxn id="75" idx="6"/>
+            <a:endCxn id="54" idx="6"/>
+          </p:cNvCxnSpPr>
+          <p:nvPr/>
+        </p:nvCxnSpPr>
+        <p:spPr>
+          <a:xfrm flipH="1">
+            <a:off x="8177440" y="2391878"/>
+            <a:ext cx="21362" cy="3175317"/>
+          </a:xfrm>
+          <a:prstGeom prst="curvedConnector3">
+            <a:avLst>
+              <a:gd name="adj1" fmla="val -4339949"/>
+            </a:avLst>
+          </a:prstGeom>
+          <a:ln w="25400">
+            <a:solidFill>
+              <a:schemeClr val="tx1"/>
+            </a:solidFill>
+            <a:tailEnd type="arrow" w="lg" len="lg"/>
+          </a:ln>
+        </p:spPr>
+        <p:style>
+          <a:lnRef idx="1">
+            <a:schemeClr val="accent1"/>
+          </a:lnRef>
+          <a:fillRef idx="0">
+            <a:schemeClr val="accent1"/>
+          </a:fillRef>
+          <a:effectRef idx="0">
+            <a:schemeClr val="accent1"/>
+          </a:effectRef>
+          <a:fontRef idx="minor">
+            <a:schemeClr val="tx1"/>
+          </a:fontRef>
+        </p:style>
+      </p:cxnSp>
+      <p:cxnSp>
+        <p:nvCxnSpPr>
+          <p:cNvPr id="93" name="Curved Connector 92"/>
+          <p:cNvCxnSpPr>
+            <a:stCxn id="73" idx="1"/>
+            <a:endCxn id="73" idx="7"/>
+          </p:cNvCxnSpPr>
+          <p:nvPr/>
+        </p:nvCxnSpPr>
+        <p:spPr>
+          <a:xfrm rot="5400000" flipH="1" flipV="1">
+            <a:off x="4109603" y="1545139"/>
+            <a:ext cx="12700" cy="1293156"/>
+          </a:xfrm>
+          <a:prstGeom prst="curvedConnector3">
+            <a:avLst>
+              <a:gd name="adj1" fmla="val 7465945"/>
+            </a:avLst>
+          </a:prstGeom>
+          <a:ln w="25400">
+            <a:solidFill>
+              <a:schemeClr val="tx1"/>
+            </a:solidFill>
+            <a:tailEnd type="arrow" w="lg" len="lg"/>
+          </a:ln>
+        </p:spPr>
+        <p:style>
+          <a:lnRef idx="1">
+            <a:schemeClr val="accent1"/>
+          </a:lnRef>
+          <a:fillRef idx="0">
+            <a:schemeClr val="accent1"/>
+          </a:fillRef>
+          <a:effectRef idx="0">
+            <a:schemeClr val="accent1"/>
+          </a:effectRef>
+          <a:fontRef idx="minor">
+            <a:schemeClr val="tx1"/>
+          </a:fontRef>
+        </p:style>
+      </p:cxnSp>
+      <p:cxnSp>
+        <p:nvCxnSpPr>
+          <p:cNvPr id="105" name="Curved Connector 104"/>
+          <p:cNvCxnSpPr>
+            <a:stCxn id="7" idx="4"/>
+            <a:endCxn id="54" idx="2"/>
+          </p:cNvCxnSpPr>
+          <p:nvPr/>
+        </p:nvCxnSpPr>
+        <p:spPr>
+          <a:xfrm rot="16200000" flipH="1">
+            <a:off x="3200970" y="2419524"/>
+            <a:ext cx="1267573" cy="5027767"/>
+          </a:xfrm>
+          <a:prstGeom prst="curvedConnector2">
+            <a:avLst/>
+          </a:prstGeom>
+          <a:ln w="25400">
+            <a:solidFill>
+              <a:schemeClr val="tx1"/>
+            </a:solidFill>
+            <a:tailEnd type="arrow" w="lg" len="lg"/>
+          </a:ln>
+        </p:spPr>
+        <p:style>
+          <a:lnRef idx="1">
+            <a:schemeClr val="accent1"/>
+          </a:lnRef>
+          <a:fillRef idx="0">
+            <a:schemeClr val="accent1"/>
+          </a:fillRef>
+          <a:effectRef idx="0">
+            <a:schemeClr val="accent1"/>
+          </a:effectRef>
+          <a:fontRef idx="minor">
+            <a:schemeClr val="tx1"/>
+          </a:fontRef>
+        </p:style>
+      </p:cxnSp>
+      <p:cxnSp>
+        <p:nvCxnSpPr>
+          <p:cNvPr id="109" name="Curved Connector 108"/>
+          <p:cNvCxnSpPr>
+            <a:stCxn id="69" idx="4"/>
+            <a:endCxn id="54" idx="2"/>
+          </p:cNvCxnSpPr>
+          <p:nvPr/>
+        </p:nvCxnSpPr>
+        <p:spPr>
+          <a:xfrm rot="16200000" flipH="1">
+            <a:off x="4599855" y="3818409"/>
+            <a:ext cx="1263731" cy="2233840"/>
+          </a:xfrm>
+          <a:prstGeom prst="curvedConnector2">
+            <a:avLst/>
+          </a:prstGeom>
+          <a:ln w="25400">
+            <a:solidFill>
+              <a:schemeClr val="tx1"/>
+            </a:solidFill>
+            <a:tailEnd type="arrow" w="lg" len="lg"/>
+          </a:ln>
+        </p:spPr>
+        <p:style>
+          <a:lnRef idx="1">
+            <a:schemeClr val="accent1"/>
+          </a:lnRef>
+          <a:fillRef idx="0">
+            <a:schemeClr val="accent1"/>
+          </a:fillRef>
+          <a:effectRef idx="0">
+            <a:schemeClr val="accent1"/>
+          </a:effectRef>
+          <a:fontRef idx="minor">
+            <a:schemeClr val="tx1"/>
+          </a:fontRef>
+        </p:style>
+      </p:cxnSp>
     </p:spTree>
     <p:extLst>
       <p:ext uri="{BB962C8B-B14F-4D97-AF65-F5344CB8AC3E}">

</xml_diff>

<commit_message>
check in the current version
</commit_message>
<xml_diff>
--- a/figure/cgc-fsm.pptx
+++ b/figure/cgc-fsm.pptx
@@ -5,10 +5,11 @@
     <p:sldMasterId id="2147483660" r:id="rId1"/>
   </p:sldMasterIdLst>
   <p:notesMasterIdLst>
-    <p:notesMasterId r:id="rId3"/>
+    <p:notesMasterId r:id="rId4"/>
   </p:notesMasterIdLst>
   <p:sldIdLst>
     <p:sldId id="262" r:id="rId2"/>
+    <p:sldId id="263" r:id="rId3"/>
   </p:sldIdLst>
   <p:sldSz cx="12192000" cy="9144000"/>
   <p:notesSz cx="6858000" cy="9144000"/>
@@ -197,7 +198,7 @@
           <a:p>
             <a:fld id="{923187C5-1DA9-2A4C-85A7-AC8D440F6CEA}" type="datetimeFigureOut">
               <a:rPr lang="en-US" smtClean="0"/>
-              <a:t>7/1/19</a:t>
+              <a:t>8/31/19</a:t>
             </a:fld>
             <a:endParaRPr lang="en-US"/>
           </a:p>
@@ -554,6 +555,95 @@
 </p:notes>
 </file>
 
+<file path=ppt/notesSlides/notesSlide2.xml><?xml version="1.0" encoding="utf-8"?>
+<p:notes xmlns:a="http://schemas.openxmlformats.org/drawingml/2006/main" xmlns:r="http://schemas.openxmlformats.org/officeDocument/2006/relationships" xmlns:p="http://schemas.openxmlformats.org/presentationml/2006/main">
+  <p:cSld>
+    <p:spTree>
+      <p:nvGrpSpPr>
+        <p:cNvPr id="1" name=""/>
+        <p:cNvGrpSpPr/>
+        <p:nvPr/>
+      </p:nvGrpSpPr>
+      <p:grpSpPr>
+        <a:xfrm>
+          <a:off x="0" y="0"/>
+          <a:ext cx="0" cy="0"/>
+          <a:chOff x="0" y="0"/>
+          <a:chExt cx="0" cy="0"/>
+        </a:xfrm>
+      </p:grpSpPr>
+      <p:sp>
+        <p:nvSpPr>
+          <p:cNvPr id="2" name="Slide Image Placeholder 1"/>
+          <p:cNvSpPr>
+            <a:spLocks noGrp="1" noRot="1" noChangeAspect="1"/>
+          </p:cNvSpPr>
+          <p:nvPr>
+            <p:ph type="sldImg"/>
+          </p:nvPr>
+        </p:nvSpPr>
+        <p:spPr>
+          <a:xfrm>
+            <a:off x="1371600" y="1143000"/>
+            <a:ext cx="4114800" cy="3086100"/>
+          </a:xfrm>
+        </p:spPr>
+      </p:sp>
+      <p:sp>
+        <p:nvSpPr>
+          <p:cNvPr id="3" name="Notes Placeholder 2"/>
+          <p:cNvSpPr>
+            <a:spLocks noGrp="1"/>
+          </p:cNvSpPr>
+          <p:nvPr>
+            <p:ph type="body" idx="1"/>
+          </p:nvPr>
+        </p:nvSpPr>
+        <p:spPr/>
+        <p:txBody>
+          <a:bodyPr/>
+          <a:lstStyle/>
+          <a:p>
+            <a:endParaRPr lang="en-US" dirty="0"/>
+          </a:p>
+        </p:txBody>
+      </p:sp>
+      <p:sp>
+        <p:nvSpPr>
+          <p:cNvPr id="4" name="Slide Number Placeholder 3"/>
+          <p:cNvSpPr>
+            <a:spLocks noGrp="1"/>
+          </p:cNvSpPr>
+          <p:nvPr>
+            <p:ph type="sldNum" sz="quarter" idx="10"/>
+          </p:nvPr>
+        </p:nvSpPr>
+        <p:spPr/>
+        <p:txBody>
+          <a:bodyPr/>
+          <a:lstStyle/>
+          <a:p>
+            <a:fld id="{287EE20A-243B-FF41-B195-E8D41D004371}" type="slidenum">
+              <a:rPr lang="en-US" smtClean="0"/>
+              <a:t>2</a:t>
+            </a:fld>
+            <a:endParaRPr lang="en-US"/>
+          </a:p>
+        </p:txBody>
+      </p:sp>
+    </p:spTree>
+    <p:extLst>
+      <p:ext uri="{BB962C8B-B14F-4D97-AF65-F5344CB8AC3E}">
+        <p14:creationId xmlns:p14="http://schemas.microsoft.com/office/powerpoint/2010/main" val="2082879590"/>
+      </p:ext>
+    </p:extLst>
+  </p:cSld>
+  <p:clrMapOvr>
+    <a:masterClrMapping/>
+  </p:clrMapOvr>
+</p:notes>
+</file>
+
 <file path=ppt/slideLayouts/slideLayout1.xml><?xml version="1.0" encoding="utf-8"?>
 <p:sldLayout xmlns:a="http://schemas.openxmlformats.org/drawingml/2006/main" xmlns:r="http://schemas.openxmlformats.org/officeDocument/2006/relationships" xmlns:p="http://schemas.openxmlformats.org/presentationml/2006/main" type="title" preserve="1">
   <p:cSld name="Title Slide">
@@ -685,7 +775,7 @@
           <a:p>
             <a:fld id="{DB9A31BD-06C4-5841-B588-4436D627F577}" type="datetimeFigureOut">
               <a:rPr lang="en-US" smtClean="0"/>
-              <a:t>7/1/19</a:t>
+              <a:t>8/31/19</a:t>
             </a:fld>
             <a:endParaRPr lang="en-US"/>
           </a:p>
@@ -850,7 +940,7 @@
           <a:p>
             <a:fld id="{DB9A31BD-06C4-5841-B588-4436D627F577}" type="datetimeFigureOut">
               <a:rPr lang="en-US" smtClean="0"/>
-              <a:t>7/1/19</a:t>
+              <a:t>8/31/19</a:t>
             </a:fld>
             <a:endParaRPr lang="en-US"/>
           </a:p>
@@ -1025,7 +1115,7 @@
           <a:p>
             <a:fld id="{DB9A31BD-06C4-5841-B588-4436D627F577}" type="datetimeFigureOut">
               <a:rPr lang="en-US" smtClean="0"/>
-              <a:t>7/1/19</a:t>
+              <a:t>8/31/19</a:t>
             </a:fld>
             <a:endParaRPr lang="en-US"/>
           </a:p>
@@ -1190,7 +1280,7 @@
           <a:p>
             <a:fld id="{DB9A31BD-06C4-5841-B588-4436D627F577}" type="datetimeFigureOut">
               <a:rPr lang="en-US" smtClean="0"/>
-              <a:t>7/1/19</a:t>
+              <a:t>8/31/19</a:t>
             </a:fld>
             <a:endParaRPr lang="en-US"/>
           </a:p>
@@ -1429,7 +1519,7 @@
           <a:p>
             <a:fld id="{DB9A31BD-06C4-5841-B588-4436D627F577}" type="datetimeFigureOut">
               <a:rPr lang="en-US" smtClean="0"/>
-              <a:t>7/1/19</a:t>
+              <a:t>8/31/19</a:t>
             </a:fld>
             <a:endParaRPr lang="en-US"/>
           </a:p>
@@ -1656,7 +1746,7 @@
           <a:p>
             <a:fld id="{DB9A31BD-06C4-5841-B588-4436D627F577}" type="datetimeFigureOut">
               <a:rPr lang="en-US" smtClean="0"/>
-              <a:t>7/1/19</a:t>
+              <a:t>8/31/19</a:t>
             </a:fld>
             <a:endParaRPr lang="en-US"/>
           </a:p>
@@ -2018,7 +2108,7 @@
           <a:p>
             <a:fld id="{DB9A31BD-06C4-5841-B588-4436D627F577}" type="datetimeFigureOut">
               <a:rPr lang="en-US" smtClean="0"/>
-              <a:t>7/1/19</a:t>
+              <a:t>8/31/19</a:t>
             </a:fld>
             <a:endParaRPr lang="en-US"/>
           </a:p>
@@ -2131,7 +2221,7 @@
           <a:p>
             <a:fld id="{DB9A31BD-06C4-5841-B588-4436D627F577}" type="datetimeFigureOut">
               <a:rPr lang="en-US" smtClean="0"/>
-              <a:t>7/1/19</a:t>
+              <a:t>8/31/19</a:t>
             </a:fld>
             <a:endParaRPr lang="en-US"/>
           </a:p>
@@ -2221,7 +2311,7 @@
           <a:p>
             <a:fld id="{DB9A31BD-06C4-5841-B588-4436D627F577}" type="datetimeFigureOut">
               <a:rPr lang="en-US" smtClean="0"/>
-              <a:t>7/1/19</a:t>
+              <a:t>8/31/19</a:t>
             </a:fld>
             <a:endParaRPr lang="en-US"/>
           </a:p>
@@ -2493,7 +2583,7 @@
           <a:p>
             <a:fld id="{DB9A31BD-06C4-5841-B588-4436D627F577}" type="datetimeFigureOut">
               <a:rPr lang="en-US" smtClean="0"/>
-              <a:t>7/1/19</a:t>
+              <a:t>8/31/19</a:t>
             </a:fld>
             <a:endParaRPr lang="en-US"/>
           </a:p>
@@ -2745,7 +2835,7 @@
           <a:p>
             <a:fld id="{DB9A31BD-06C4-5841-B588-4436D627F577}" type="datetimeFigureOut">
               <a:rPr lang="en-US" smtClean="0"/>
-              <a:t>7/1/19</a:t>
+              <a:t>8/31/19</a:t>
             </a:fld>
             <a:endParaRPr lang="en-US"/>
           </a:p>
@@ -2953,7 +3043,7 @@
           <a:p>
             <a:fld id="{DB9A31BD-06C4-5841-B588-4436D627F577}" type="datetimeFigureOut">
               <a:rPr lang="en-US" smtClean="0"/>
-              <a:t>7/1/19</a:t>
+              <a:t>8/31/19</a:t>
             </a:fld>
             <a:endParaRPr lang="en-US"/>
           </a:p>
@@ -3366,7 +3456,7 @@
         </p:nvSpPr>
         <p:spPr>
           <a:xfrm>
-            <a:off x="406473" y="3722106"/>
+            <a:off x="1959499" y="4201072"/>
             <a:ext cx="1828800" cy="577516"/>
           </a:xfrm>
           <a:prstGeom prst="ellipse">
@@ -3416,7 +3506,7 @@
         </p:nvSpPr>
         <p:spPr>
           <a:xfrm>
-            <a:off x="942677" y="3765517"/>
+            <a:off x="2495703" y="4244483"/>
             <a:ext cx="757836" cy="461665"/>
           </a:xfrm>
           <a:prstGeom prst="rect">
@@ -3449,7 +3539,7 @@
         </p:nvCxnSpPr>
         <p:spPr>
           <a:xfrm>
-            <a:off x="2235273" y="4010864"/>
+            <a:off x="3788299" y="4489830"/>
             <a:ext cx="965127" cy="3842"/>
           </a:xfrm>
           <a:prstGeom prst="straightConnector1">
@@ -3485,7 +3575,7 @@
         </p:nvSpPr>
         <p:spPr>
           <a:xfrm>
-            <a:off x="6348640" y="5278437"/>
+            <a:off x="7901666" y="5757403"/>
             <a:ext cx="1828800" cy="577516"/>
           </a:xfrm>
           <a:prstGeom prst="ellipse">
@@ -3535,7 +3625,7 @@
         </p:nvSpPr>
         <p:spPr>
           <a:xfrm>
-            <a:off x="6882135" y="5336361"/>
+            <a:off x="8435161" y="5815327"/>
             <a:ext cx="817724" cy="461665"/>
           </a:xfrm>
           <a:prstGeom prst="rect">
@@ -3565,7 +3655,7 @@
         </p:nvSpPr>
         <p:spPr>
           <a:xfrm>
-            <a:off x="3200400" y="3725948"/>
+            <a:off x="4753426" y="4204914"/>
             <a:ext cx="1828800" cy="577516"/>
           </a:xfrm>
           <a:prstGeom prst="ellipse">
@@ -3615,7 +3705,7 @@
         </p:nvSpPr>
         <p:spPr>
           <a:xfrm>
-            <a:off x="3439293" y="3765514"/>
+            <a:off x="4992319" y="4244480"/>
             <a:ext cx="1353319" cy="461665"/>
           </a:xfrm>
           <a:prstGeom prst="rect">
@@ -3645,7 +3735,7 @@
         </p:nvSpPr>
         <p:spPr>
           <a:xfrm>
-            <a:off x="6371584" y="3725948"/>
+            <a:off x="7924610" y="4204914"/>
             <a:ext cx="1828800" cy="577516"/>
           </a:xfrm>
           <a:prstGeom prst="ellipse">
@@ -3695,7 +3785,7 @@
         </p:nvSpPr>
         <p:spPr>
           <a:xfrm>
-            <a:off x="6622686" y="3772289"/>
+            <a:off x="8175712" y="4251255"/>
             <a:ext cx="1350113" cy="461665"/>
           </a:xfrm>
           <a:prstGeom prst="rect">
@@ -3725,7 +3815,7 @@
         </p:nvSpPr>
         <p:spPr>
           <a:xfrm>
-            <a:off x="3195203" y="2107142"/>
+            <a:off x="4748229" y="2586108"/>
             <a:ext cx="1828800" cy="577516"/>
           </a:xfrm>
           <a:prstGeom prst="ellipse">
@@ -3775,7 +3865,7 @@
         </p:nvSpPr>
         <p:spPr>
           <a:xfrm>
-            <a:off x="3169259" y="2160150"/>
+            <a:off x="4722285" y="2639116"/>
             <a:ext cx="1850186" cy="461665"/>
           </a:xfrm>
           <a:prstGeom prst="rect">
@@ -3805,7 +3895,7 @@
         </p:nvSpPr>
         <p:spPr>
           <a:xfrm>
-            <a:off x="6370002" y="2103120"/>
+            <a:off x="7923028" y="2582086"/>
             <a:ext cx="1828800" cy="577516"/>
           </a:xfrm>
           <a:prstGeom prst="ellipse">
@@ -3855,7 +3945,7 @@
         </p:nvSpPr>
         <p:spPr>
           <a:xfrm>
-            <a:off x="6340928" y="2151909"/>
+            <a:off x="7893954" y="2630875"/>
             <a:ext cx="1846980" cy="461665"/>
           </a:xfrm>
           <a:prstGeom prst="rect">
@@ -3885,7 +3975,7 @@
         </p:nvSpPr>
         <p:spPr>
           <a:xfrm>
-            <a:off x="2576603" y="3475228"/>
+            <a:off x="4129629" y="3954194"/>
             <a:ext cx="330540" cy="461665"/>
           </a:xfrm>
           <a:prstGeom prst="rect">
@@ -3918,7 +4008,7 @@
         </p:nvCxnSpPr>
         <p:spPr>
           <a:xfrm>
-            <a:off x="5029200" y="4014706"/>
+            <a:off x="6582226" y="4493672"/>
             <a:ext cx="1342384" cy="0"/>
           </a:xfrm>
           <a:prstGeom prst="straightConnector1">
@@ -3954,7 +4044,7 @@
         </p:nvSpPr>
         <p:spPr>
           <a:xfrm>
-            <a:off x="5578166" y="3474720"/>
+            <a:off x="7131192" y="3953686"/>
             <a:ext cx="330540" cy="461665"/>
           </a:xfrm>
           <a:prstGeom prst="rect">
@@ -3987,7 +4077,7 @@
         </p:nvCxnSpPr>
         <p:spPr>
           <a:xfrm flipH="1" flipV="1">
-            <a:off x="4109603" y="2684658"/>
+            <a:off x="5662629" y="3163624"/>
             <a:ext cx="5197" cy="1041290"/>
           </a:xfrm>
           <a:prstGeom prst="straightConnector1">
@@ -4023,7 +4113,7 @@
         </p:nvSpPr>
         <p:spPr>
           <a:xfrm>
-            <a:off x="3581644" y="3020637"/>
+            <a:off x="5134670" y="3499603"/>
             <a:ext cx="319318" cy="461665"/>
           </a:xfrm>
           <a:prstGeom prst="rect">
@@ -4056,7 +4146,7 @@
         </p:nvCxnSpPr>
         <p:spPr>
           <a:xfrm flipV="1">
-            <a:off x="5024003" y="2391878"/>
+            <a:off x="6577029" y="2870844"/>
             <a:ext cx="1345999" cy="4022"/>
           </a:xfrm>
           <a:prstGeom prst="straightConnector1">
@@ -4092,7 +4182,7 @@
         </p:nvSpPr>
         <p:spPr>
           <a:xfrm>
-            <a:off x="5552814" y="1931154"/>
+            <a:off x="7105840" y="2410120"/>
             <a:ext cx="319318" cy="461665"/>
           </a:xfrm>
           <a:prstGeom prst="rect">
@@ -4125,7 +4215,7 @@
         </p:nvCxnSpPr>
         <p:spPr>
           <a:xfrm>
-            <a:off x="7284402" y="2680636"/>
+            <a:off x="8837428" y="3159602"/>
             <a:ext cx="1582" cy="1045312"/>
           </a:xfrm>
           <a:prstGeom prst="straightConnector1">
@@ -4161,7 +4251,7 @@
         </p:nvSpPr>
         <p:spPr>
           <a:xfrm>
-            <a:off x="6850293" y="2976898"/>
+            <a:off x="8403319" y="3455864"/>
             <a:ext cx="330540" cy="461665"/>
           </a:xfrm>
           <a:prstGeom prst="rect">
@@ -4194,7 +4284,7 @@
         </p:nvCxnSpPr>
         <p:spPr>
           <a:xfrm flipH="1">
-            <a:off x="8177440" y="2391878"/>
+            <a:off x="9730466" y="2870844"/>
             <a:ext cx="21362" cy="3175317"/>
           </a:xfrm>
           <a:prstGeom prst="curvedConnector3">
@@ -4235,7 +4325,7 @@
         </p:nvCxnSpPr>
         <p:spPr>
           <a:xfrm rot="5400000" flipH="1" flipV="1">
-            <a:off x="4109603" y="1545139"/>
+            <a:off x="5662629" y="2024105"/>
             <a:ext cx="12700" cy="1293156"/>
           </a:xfrm>
           <a:prstGeom prst="curvedConnector3">
@@ -4276,7 +4366,7 @@
         </p:nvCxnSpPr>
         <p:spPr>
           <a:xfrm rot="16200000" flipH="1">
-            <a:off x="3200970" y="2419524"/>
+            <a:off x="4753996" y="2898490"/>
             <a:ext cx="1267573" cy="5027767"/>
           </a:xfrm>
           <a:prstGeom prst="curvedConnector2">
@@ -4315,7 +4405,7 @@
         </p:nvCxnSpPr>
         <p:spPr>
           <a:xfrm rot="16200000" flipH="1">
-            <a:off x="4599855" y="3818409"/>
+            <a:off x="6152881" y="4297375"/>
             <a:ext cx="1263731" cy="2233840"/>
           </a:xfrm>
           <a:prstGeom prst="curvedConnector2">
@@ -4347,6 +4437,1037 @@
     <p:extLst>
       <p:ext uri="{BB962C8B-B14F-4D97-AF65-F5344CB8AC3E}">
         <p14:creationId xmlns:p14="http://schemas.microsoft.com/office/powerpoint/2010/main" val="1994381605"/>
+      </p:ext>
+    </p:extLst>
+  </p:cSld>
+  <p:clrMapOvr>
+    <a:masterClrMapping/>
+  </p:clrMapOvr>
+  <p:timing>
+    <p:tnLst>
+      <p:par>
+        <p:cTn id="1" dur="indefinite" restart="never" nodeType="tmRoot"/>
+      </p:par>
+    </p:tnLst>
+  </p:timing>
+</p:sld>
+</file>
+
+<file path=ppt/slides/slide2.xml><?xml version="1.0" encoding="utf-8"?>
+<p:sld xmlns:a="http://schemas.openxmlformats.org/drawingml/2006/main" xmlns:r="http://schemas.openxmlformats.org/officeDocument/2006/relationships" xmlns:p="http://schemas.openxmlformats.org/presentationml/2006/main">
+  <p:cSld>
+    <p:spTree>
+      <p:nvGrpSpPr>
+        <p:cNvPr id="1" name=""/>
+        <p:cNvGrpSpPr/>
+        <p:nvPr/>
+      </p:nvGrpSpPr>
+      <p:grpSpPr>
+        <a:xfrm>
+          <a:off x="0" y="0"/>
+          <a:ext cx="0" cy="0"/>
+          <a:chOff x="0" y="0"/>
+          <a:chExt cx="0" cy="0"/>
+        </a:xfrm>
+      </p:grpSpPr>
+      <p:sp>
+        <p:nvSpPr>
+          <p:cNvPr id="7" name="Oval 6"/>
+          <p:cNvSpPr>
+            <a:spLocks noChangeAspect="1"/>
+          </p:cNvSpPr>
+          <p:nvPr/>
+        </p:nvSpPr>
+        <p:spPr>
+          <a:xfrm>
+            <a:off x="1423854" y="4206240"/>
+            <a:ext cx="2414345" cy="762425"/>
+          </a:xfrm>
+          <a:prstGeom prst="ellipse">
+            <a:avLst/>
+          </a:prstGeom>
+          <a:noFill/>
+          <a:ln w="31750">
+            <a:solidFill>
+              <a:schemeClr val="tx1"/>
+            </a:solidFill>
+          </a:ln>
+        </p:spPr>
+        <p:style>
+          <a:lnRef idx="2">
+            <a:schemeClr val="accent1">
+              <a:shade val="50000"/>
+            </a:schemeClr>
+          </a:lnRef>
+          <a:fillRef idx="1">
+            <a:schemeClr val="accent1"/>
+          </a:fillRef>
+          <a:effectRef idx="0">
+            <a:schemeClr val="accent1"/>
+          </a:effectRef>
+          <a:fontRef idx="minor">
+            <a:schemeClr val="lt1"/>
+          </a:fontRef>
+        </p:style>
+        <p:txBody>
+          <a:bodyPr rtlCol="0" anchor="ctr"/>
+          <a:lstStyle/>
+          <a:p>
+            <a:pPr algn="ctr"/>
+            <a:endParaRPr lang="en-US" dirty="0">
+              <a:solidFill>
+                <a:schemeClr val="tx1"/>
+              </a:solidFill>
+            </a:endParaRPr>
+          </a:p>
+        </p:txBody>
+      </p:sp>
+      <p:sp>
+        <p:nvSpPr>
+          <p:cNvPr id="20" name="TextBox 19"/>
+          <p:cNvSpPr txBox="1"/>
+          <p:nvPr/>
+        </p:nvSpPr>
+        <p:spPr>
+          <a:xfrm>
+            <a:off x="2138267" y="4324461"/>
+            <a:ext cx="854465" cy="523220"/>
+          </a:xfrm>
+          <a:prstGeom prst="rect">
+            <a:avLst/>
+          </a:prstGeom>
+          <a:noFill/>
+        </p:spPr>
+        <p:txBody>
+          <a:bodyPr wrap="none" rtlCol="0">
+            <a:spAutoFit/>
+          </a:bodyPr>
+          <a:lstStyle/>
+          <a:p>
+            <a:r>
+              <a:rPr lang="en-US" sz="2800" dirty="0" smtClean="0"/>
+              <a:t>start</a:t>
+            </a:r>
+            <a:endParaRPr lang="en-US" sz="2800" dirty="0"/>
+          </a:p>
+        </p:txBody>
+      </p:sp>
+      <p:cxnSp>
+        <p:nvCxnSpPr>
+          <p:cNvPr id="27" name="Straight Arrow Connector 26"/>
+          <p:cNvCxnSpPr>
+            <a:stCxn id="7" idx="6"/>
+            <a:endCxn id="69" idx="2"/>
+          </p:cNvCxnSpPr>
+          <p:nvPr/>
+        </p:nvCxnSpPr>
+        <p:spPr>
+          <a:xfrm flipV="1">
+            <a:off x="3838199" y="4586072"/>
+            <a:ext cx="915225" cy="1381"/>
+          </a:xfrm>
+          <a:prstGeom prst="straightConnector1">
+            <a:avLst/>
+          </a:prstGeom>
+          <a:ln w="25400">
+            <a:solidFill>
+              <a:schemeClr val="tx1"/>
+            </a:solidFill>
+            <a:tailEnd type="arrow" w="lg" len="lg"/>
+          </a:ln>
+        </p:spPr>
+        <p:style>
+          <a:lnRef idx="1">
+            <a:schemeClr val="accent1"/>
+          </a:lnRef>
+          <a:fillRef idx="0">
+            <a:schemeClr val="accent1"/>
+          </a:fillRef>
+          <a:effectRef idx="0">
+            <a:schemeClr val="accent1"/>
+          </a:effectRef>
+          <a:fontRef idx="minor">
+            <a:schemeClr val="tx1"/>
+          </a:fontRef>
+        </p:style>
+      </p:cxnSp>
+      <p:sp>
+        <p:nvSpPr>
+          <p:cNvPr id="68" name="TextBox 67"/>
+          <p:cNvSpPr txBox="1"/>
+          <p:nvPr/>
+        </p:nvSpPr>
+        <p:spPr>
+          <a:xfrm>
+            <a:off x="8829761" y="5971491"/>
+            <a:ext cx="921086" cy="523220"/>
+          </a:xfrm>
+          <a:prstGeom prst="rect">
+            <a:avLst/>
+          </a:prstGeom>
+          <a:noFill/>
+        </p:spPr>
+        <p:txBody>
+          <a:bodyPr wrap="none" rtlCol="0">
+            <a:spAutoFit/>
+          </a:bodyPr>
+          <a:lstStyle/>
+          <a:p>
+            <a:r>
+              <a:rPr lang="en-US" sz="2800" dirty="0" smtClean="0"/>
+              <a:t>error</a:t>
+            </a:r>
+            <a:endParaRPr lang="en-US" sz="2800" dirty="0"/>
+          </a:p>
+        </p:txBody>
+      </p:sp>
+      <p:sp>
+        <p:nvSpPr>
+          <p:cNvPr id="69" name="Oval 68"/>
+          <p:cNvSpPr>
+            <a:spLocks noChangeAspect="1"/>
+          </p:cNvSpPr>
+          <p:nvPr/>
+        </p:nvSpPr>
+        <p:spPr>
+          <a:xfrm>
+            <a:off x="4753424" y="4204911"/>
+            <a:ext cx="2414016" cy="762321"/>
+          </a:xfrm>
+          <a:prstGeom prst="ellipse">
+            <a:avLst/>
+          </a:prstGeom>
+          <a:noFill/>
+          <a:ln w="31750">
+            <a:solidFill>
+              <a:schemeClr val="tx1"/>
+            </a:solidFill>
+          </a:ln>
+        </p:spPr>
+        <p:style>
+          <a:lnRef idx="2">
+            <a:schemeClr val="accent1">
+              <a:shade val="50000"/>
+            </a:schemeClr>
+          </a:lnRef>
+          <a:fillRef idx="1">
+            <a:schemeClr val="accent1"/>
+          </a:fillRef>
+          <a:effectRef idx="0">
+            <a:schemeClr val="accent1"/>
+          </a:effectRef>
+          <a:fontRef idx="minor">
+            <a:schemeClr val="lt1"/>
+          </a:fontRef>
+        </p:style>
+        <p:txBody>
+          <a:bodyPr rtlCol="0" anchor="ctr"/>
+          <a:lstStyle/>
+          <a:p>
+            <a:pPr algn="ctr"/>
+            <a:endParaRPr lang="en-US" dirty="0">
+              <a:solidFill>
+                <a:schemeClr val="tx1"/>
+              </a:solidFill>
+            </a:endParaRPr>
+          </a:p>
+        </p:txBody>
+      </p:sp>
+      <p:sp>
+        <p:nvSpPr>
+          <p:cNvPr id="70" name="TextBox 69"/>
+          <p:cNvSpPr txBox="1"/>
+          <p:nvPr/>
+        </p:nvSpPr>
+        <p:spPr>
+          <a:xfrm>
+            <a:off x="5178388" y="4325112"/>
+            <a:ext cx="1547027" cy="523220"/>
+          </a:xfrm>
+          <a:prstGeom prst="rect">
+            <a:avLst/>
+          </a:prstGeom>
+          <a:noFill/>
+        </p:spPr>
+        <p:txBody>
+          <a:bodyPr wrap="none" rtlCol="0">
+            <a:spAutoFit/>
+          </a:bodyPr>
+          <a:lstStyle/>
+          <a:p>
+            <a:r>
+              <a:rPr lang="en-US" sz="2800" dirty="0" err="1" smtClean="0"/>
+              <a:t>open_set</a:t>
+            </a:r>
+            <a:endParaRPr lang="en-US" sz="2800" dirty="0"/>
+          </a:p>
+        </p:txBody>
+      </p:sp>
+      <p:sp>
+        <p:nvSpPr>
+          <p:cNvPr id="71" name="Oval 70"/>
+          <p:cNvSpPr>
+            <a:spLocks noChangeAspect="1"/>
+          </p:cNvSpPr>
+          <p:nvPr/>
+        </p:nvSpPr>
+        <p:spPr>
+          <a:xfrm>
+            <a:off x="8083296" y="4204912"/>
+            <a:ext cx="2414018" cy="762321"/>
+          </a:xfrm>
+          <a:prstGeom prst="ellipse">
+            <a:avLst/>
+          </a:prstGeom>
+          <a:noFill/>
+          <a:ln w="31750">
+            <a:solidFill>
+              <a:schemeClr val="tx1"/>
+            </a:solidFill>
+          </a:ln>
+        </p:spPr>
+        <p:style>
+          <a:lnRef idx="2">
+            <a:schemeClr val="accent1">
+              <a:shade val="50000"/>
+            </a:schemeClr>
+          </a:lnRef>
+          <a:fillRef idx="1">
+            <a:schemeClr val="accent1"/>
+          </a:fillRef>
+          <a:effectRef idx="0">
+            <a:schemeClr val="accent1"/>
+          </a:effectRef>
+          <a:fontRef idx="minor">
+            <a:schemeClr val="lt1"/>
+          </a:fontRef>
+        </p:style>
+        <p:txBody>
+          <a:bodyPr rtlCol="0" anchor="ctr"/>
+          <a:lstStyle/>
+          <a:p>
+            <a:pPr algn="ctr"/>
+            <a:endParaRPr lang="en-US" dirty="0">
+              <a:solidFill>
+                <a:schemeClr val="tx1"/>
+              </a:solidFill>
+            </a:endParaRPr>
+          </a:p>
+        </p:txBody>
+      </p:sp>
+      <p:sp>
+        <p:nvSpPr>
+          <p:cNvPr id="72" name="TextBox 71"/>
+          <p:cNvSpPr txBox="1"/>
+          <p:nvPr/>
+        </p:nvSpPr>
+        <p:spPr>
+          <a:xfrm>
+            <a:off x="8518391" y="4325112"/>
+            <a:ext cx="1543821" cy="523220"/>
+          </a:xfrm>
+          <a:prstGeom prst="rect">
+            <a:avLst/>
+          </a:prstGeom>
+          <a:noFill/>
+        </p:spPr>
+        <p:txBody>
+          <a:bodyPr wrap="none" rtlCol="0">
+            <a:spAutoFit/>
+          </a:bodyPr>
+          <a:lstStyle/>
+          <a:p>
+            <a:r>
+              <a:rPr lang="en-US" sz="2800" dirty="0" err="1" smtClean="0"/>
+              <a:t>close_set</a:t>
+            </a:r>
+            <a:endParaRPr lang="en-US" sz="2800" dirty="0"/>
+          </a:p>
+        </p:txBody>
+      </p:sp>
+      <p:sp>
+        <p:nvSpPr>
+          <p:cNvPr id="73" name="Oval 72"/>
+          <p:cNvSpPr>
+            <a:spLocks noChangeAspect="1"/>
+          </p:cNvSpPr>
+          <p:nvPr/>
+        </p:nvSpPr>
+        <p:spPr>
+          <a:xfrm>
+            <a:off x="4754879" y="2331719"/>
+            <a:ext cx="2414018" cy="762321"/>
+          </a:xfrm>
+          <a:prstGeom prst="ellipse">
+            <a:avLst/>
+          </a:prstGeom>
+          <a:noFill/>
+          <a:ln w="31750">
+            <a:solidFill>
+              <a:schemeClr val="tx1"/>
+            </a:solidFill>
+          </a:ln>
+        </p:spPr>
+        <p:style>
+          <a:lnRef idx="2">
+            <a:schemeClr val="accent1">
+              <a:shade val="50000"/>
+            </a:schemeClr>
+          </a:lnRef>
+          <a:fillRef idx="1">
+            <a:schemeClr val="accent1"/>
+          </a:fillRef>
+          <a:effectRef idx="0">
+            <a:schemeClr val="accent1"/>
+          </a:effectRef>
+          <a:fontRef idx="minor">
+            <a:schemeClr val="lt1"/>
+          </a:fontRef>
+        </p:style>
+        <p:txBody>
+          <a:bodyPr rtlCol="0" anchor="ctr"/>
+          <a:lstStyle/>
+          <a:p>
+            <a:pPr algn="ctr"/>
+            <a:endParaRPr lang="en-US" dirty="0">
+              <a:solidFill>
+                <a:schemeClr val="tx1"/>
+              </a:solidFill>
+            </a:endParaRPr>
+          </a:p>
+        </p:txBody>
+      </p:sp>
+      <p:sp>
+        <p:nvSpPr>
+          <p:cNvPr id="74" name="TextBox 73"/>
+          <p:cNvSpPr txBox="1"/>
+          <p:nvPr/>
+        </p:nvSpPr>
+        <p:spPr>
+          <a:xfrm>
+            <a:off x="4898937" y="2459863"/>
+            <a:ext cx="2125903" cy="523220"/>
+          </a:xfrm>
+          <a:prstGeom prst="rect">
+            <a:avLst/>
+          </a:prstGeom>
+          <a:noFill/>
+        </p:spPr>
+        <p:txBody>
+          <a:bodyPr wrap="none" rtlCol="0">
+            <a:spAutoFit/>
+          </a:bodyPr>
+          <a:lstStyle/>
+          <a:p>
+            <a:r>
+              <a:rPr lang="en-US" sz="2800" dirty="0" err="1" smtClean="0"/>
+              <a:t>open_double</a:t>
+            </a:r>
+            <a:endParaRPr lang="en-US" sz="2800" dirty="0"/>
+          </a:p>
+        </p:txBody>
+      </p:sp>
+      <p:sp>
+        <p:nvSpPr>
+          <p:cNvPr id="75" name="Oval 74"/>
+          <p:cNvSpPr>
+            <a:spLocks noChangeAspect="1"/>
+          </p:cNvSpPr>
+          <p:nvPr/>
+        </p:nvSpPr>
+        <p:spPr>
+          <a:xfrm>
+            <a:off x="8083296" y="2335344"/>
+            <a:ext cx="2414016" cy="762322"/>
+          </a:xfrm>
+          <a:prstGeom prst="ellipse">
+            <a:avLst/>
+          </a:prstGeom>
+          <a:noFill/>
+          <a:ln w="31750">
+            <a:solidFill>
+              <a:schemeClr val="tx1"/>
+            </a:solidFill>
+          </a:ln>
+        </p:spPr>
+        <p:style>
+          <a:lnRef idx="2">
+            <a:schemeClr val="accent1">
+              <a:shade val="50000"/>
+            </a:schemeClr>
+          </a:lnRef>
+          <a:fillRef idx="1">
+            <a:schemeClr val="accent1"/>
+          </a:fillRef>
+          <a:effectRef idx="0">
+            <a:schemeClr val="accent1"/>
+          </a:effectRef>
+          <a:fontRef idx="minor">
+            <a:schemeClr val="lt1"/>
+          </a:fontRef>
+        </p:style>
+        <p:txBody>
+          <a:bodyPr rtlCol="0" anchor="ctr"/>
+          <a:lstStyle/>
+          <a:p>
+            <a:pPr algn="ctr"/>
+            <a:endParaRPr lang="en-US" dirty="0">
+              <a:solidFill>
+                <a:schemeClr val="tx1"/>
+              </a:solidFill>
+            </a:endParaRPr>
+          </a:p>
+        </p:txBody>
+      </p:sp>
+      <p:sp>
+        <p:nvSpPr>
+          <p:cNvPr id="76" name="TextBox 75"/>
+          <p:cNvSpPr txBox="1"/>
+          <p:nvPr/>
+        </p:nvSpPr>
+        <p:spPr>
+          <a:xfrm>
+            <a:off x="8228954" y="2459736"/>
+            <a:ext cx="2122697" cy="523220"/>
+          </a:xfrm>
+          <a:prstGeom prst="rect">
+            <a:avLst/>
+          </a:prstGeom>
+          <a:noFill/>
+        </p:spPr>
+        <p:txBody>
+          <a:bodyPr wrap="none" rtlCol="0">
+            <a:spAutoFit/>
+          </a:bodyPr>
+          <a:lstStyle/>
+          <a:p>
+            <a:r>
+              <a:rPr lang="en-US" sz="2800" dirty="0" err="1" smtClean="0"/>
+              <a:t>close_double</a:t>
+            </a:r>
+            <a:endParaRPr lang="en-US" sz="2800" dirty="0"/>
+          </a:p>
+        </p:txBody>
+      </p:sp>
+      <p:sp>
+        <p:nvSpPr>
+          <p:cNvPr id="34" name="TextBox 33"/>
+          <p:cNvSpPr txBox="1"/>
+          <p:nvPr/>
+        </p:nvSpPr>
+        <p:spPr>
+          <a:xfrm>
+            <a:off x="4086087" y="3910652"/>
+            <a:ext cx="354584" cy="523220"/>
+          </a:xfrm>
+          <a:prstGeom prst="rect">
+            <a:avLst/>
+          </a:prstGeom>
+          <a:noFill/>
+        </p:spPr>
+        <p:txBody>
+          <a:bodyPr wrap="none" rtlCol="0">
+            <a:spAutoFit/>
+          </a:bodyPr>
+          <a:lstStyle/>
+          <a:p>
+            <a:r>
+              <a:rPr lang="en-US" sz="2800" b="1" dirty="0" smtClean="0"/>
+              <a:t>|</a:t>
+            </a:r>
+            <a:endParaRPr lang="en-US" sz="2800" b="1" dirty="0"/>
+          </a:p>
+        </p:txBody>
+      </p:sp>
+      <p:cxnSp>
+        <p:nvCxnSpPr>
+          <p:cNvPr id="77" name="Straight Arrow Connector 76"/>
+          <p:cNvCxnSpPr>
+            <a:stCxn id="69" idx="6"/>
+            <a:endCxn id="71" idx="2"/>
+          </p:cNvCxnSpPr>
+          <p:nvPr/>
+        </p:nvCxnSpPr>
+        <p:spPr>
+          <a:xfrm>
+            <a:off x="7167440" y="4586072"/>
+            <a:ext cx="915856" cy="1"/>
+          </a:xfrm>
+          <a:prstGeom prst="straightConnector1">
+            <a:avLst/>
+          </a:prstGeom>
+          <a:ln w="25400">
+            <a:solidFill>
+              <a:schemeClr val="tx1"/>
+            </a:solidFill>
+            <a:tailEnd type="arrow" w="lg" len="lg"/>
+          </a:ln>
+        </p:spPr>
+        <p:style>
+          <a:lnRef idx="1">
+            <a:schemeClr val="accent1"/>
+          </a:lnRef>
+          <a:fillRef idx="0">
+            <a:schemeClr val="accent1"/>
+          </a:fillRef>
+          <a:effectRef idx="0">
+            <a:schemeClr val="accent1"/>
+          </a:effectRef>
+          <a:fontRef idx="minor">
+            <a:schemeClr val="tx1"/>
+          </a:fontRef>
+        </p:style>
+      </p:cxnSp>
+      <p:sp>
+        <p:nvSpPr>
+          <p:cNvPr id="78" name="TextBox 77"/>
+          <p:cNvSpPr txBox="1"/>
+          <p:nvPr/>
+        </p:nvSpPr>
+        <p:spPr>
+          <a:xfrm>
+            <a:off x="7388405" y="3910652"/>
+            <a:ext cx="354584" cy="523220"/>
+          </a:xfrm>
+          <a:prstGeom prst="rect">
+            <a:avLst/>
+          </a:prstGeom>
+          <a:noFill/>
+        </p:spPr>
+        <p:txBody>
+          <a:bodyPr wrap="none" rtlCol="0">
+            <a:spAutoFit/>
+          </a:bodyPr>
+          <a:lstStyle/>
+          <a:p>
+            <a:r>
+              <a:rPr lang="en-US" sz="2800" b="1" dirty="0" smtClean="0"/>
+              <a:t>|</a:t>
+            </a:r>
+            <a:endParaRPr lang="en-US" sz="2800" b="1" dirty="0"/>
+          </a:p>
+        </p:txBody>
+      </p:sp>
+      <p:cxnSp>
+        <p:nvCxnSpPr>
+          <p:cNvPr id="79" name="Straight Arrow Connector 78"/>
+          <p:cNvCxnSpPr>
+            <a:stCxn id="69" idx="0"/>
+            <a:endCxn id="73" idx="4"/>
+          </p:cNvCxnSpPr>
+          <p:nvPr/>
+        </p:nvCxnSpPr>
+        <p:spPr>
+          <a:xfrm flipV="1">
+            <a:off x="5960432" y="3094040"/>
+            <a:ext cx="1456" cy="1110871"/>
+          </a:xfrm>
+          <a:prstGeom prst="straightConnector1">
+            <a:avLst/>
+          </a:prstGeom>
+          <a:ln w="25400">
+            <a:solidFill>
+              <a:schemeClr val="tx1"/>
+            </a:solidFill>
+            <a:tailEnd type="arrow" w="lg" len="lg"/>
+          </a:ln>
+        </p:spPr>
+        <p:style>
+          <a:lnRef idx="1">
+            <a:schemeClr val="accent1"/>
+          </a:lnRef>
+          <a:fillRef idx="0">
+            <a:schemeClr val="accent1"/>
+          </a:fillRef>
+          <a:effectRef idx="0">
+            <a:schemeClr val="accent1"/>
+          </a:effectRef>
+          <a:fontRef idx="minor">
+            <a:schemeClr val="tx1"/>
+          </a:fontRef>
+        </p:style>
+      </p:cxnSp>
+      <p:sp>
+        <p:nvSpPr>
+          <p:cNvPr id="80" name="TextBox 79"/>
+          <p:cNvSpPr txBox="1"/>
+          <p:nvPr/>
+        </p:nvSpPr>
+        <p:spPr>
+          <a:xfrm>
+            <a:off x="5230368" y="3398005"/>
+            <a:ext cx="340158" cy="523220"/>
+          </a:xfrm>
+          <a:prstGeom prst="rect">
+            <a:avLst/>
+          </a:prstGeom>
+          <a:noFill/>
+        </p:spPr>
+        <p:txBody>
+          <a:bodyPr wrap="none" rtlCol="0">
+            <a:spAutoFit/>
+          </a:bodyPr>
+          <a:lstStyle/>
+          <a:p>
+            <a:r>
+              <a:rPr lang="en-US" sz="2800" b="1" dirty="0" smtClean="0"/>
+              <a:t>“</a:t>
+            </a:r>
+            <a:endParaRPr lang="en-US" sz="2800" b="1" dirty="0"/>
+          </a:p>
+        </p:txBody>
+      </p:sp>
+      <p:cxnSp>
+        <p:nvCxnSpPr>
+          <p:cNvPr id="81" name="Straight Arrow Connector 80"/>
+          <p:cNvCxnSpPr>
+            <a:stCxn id="73" idx="6"/>
+            <a:endCxn id="75" idx="2"/>
+          </p:cNvCxnSpPr>
+          <p:nvPr/>
+        </p:nvCxnSpPr>
+        <p:spPr>
+          <a:xfrm>
+            <a:off x="7168897" y="2712880"/>
+            <a:ext cx="914399" cy="3625"/>
+          </a:xfrm>
+          <a:prstGeom prst="straightConnector1">
+            <a:avLst/>
+          </a:prstGeom>
+          <a:ln w="25400">
+            <a:solidFill>
+              <a:schemeClr val="tx1"/>
+            </a:solidFill>
+            <a:tailEnd type="arrow" w="lg" len="lg"/>
+          </a:ln>
+        </p:spPr>
+        <p:style>
+          <a:lnRef idx="1">
+            <a:schemeClr val="accent1"/>
+          </a:lnRef>
+          <a:fillRef idx="0">
+            <a:schemeClr val="accent1"/>
+          </a:fillRef>
+          <a:effectRef idx="0">
+            <a:schemeClr val="accent1"/>
+          </a:effectRef>
+          <a:fontRef idx="minor">
+            <a:schemeClr val="tx1"/>
+          </a:fontRef>
+        </p:style>
+      </p:cxnSp>
+      <p:sp>
+        <p:nvSpPr>
+          <p:cNvPr id="82" name="TextBox 81"/>
+          <p:cNvSpPr txBox="1"/>
+          <p:nvPr/>
+        </p:nvSpPr>
+        <p:spPr>
+          <a:xfrm>
+            <a:off x="7389832" y="2039112"/>
+            <a:ext cx="340158" cy="523220"/>
+          </a:xfrm>
+          <a:prstGeom prst="rect">
+            <a:avLst/>
+          </a:prstGeom>
+          <a:noFill/>
+        </p:spPr>
+        <p:txBody>
+          <a:bodyPr wrap="none" rtlCol="0">
+            <a:spAutoFit/>
+          </a:bodyPr>
+          <a:lstStyle/>
+          <a:p>
+            <a:r>
+              <a:rPr lang="en-US" sz="2800" b="1" dirty="0" smtClean="0"/>
+              <a:t>”</a:t>
+            </a:r>
+            <a:endParaRPr lang="en-US" sz="2800" b="1" dirty="0"/>
+          </a:p>
+        </p:txBody>
+      </p:sp>
+      <p:cxnSp>
+        <p:nvCxnSpPr>
+          <p:cNvPr id="83" name="Straight Arrow Connector 82"/>
+          <p:cNvCxnSpPr>
+            <a:stCxn id="75" idx="4"/>
+            <a:endCxn id="71" idx="0"/>
+          </p:cNvCxnSpPr>
+          <p:nvPr/>
+        </p:nvCxnSpPr>
+        <p:spPr>
+          <a:xfrm>
+            <a:off x="9290304" y="3097666"/>
+            <a:ext cx="1" cy="1107246"/>
+          </a:xfrm>
+          <a:prstGeom prst="straightConnector1">
+            <a:avLst/>
+          </a:prstGeom>
+          <a:ln w="25400">
+            <a:solidFill>
+              <a:schemeClr val="tx1"/>
+            </a:solidFill>
+            <a:tailEnd type="arrow" w="lg" len="lg"/>
+          </a:ln>
+        </p:spPr>
+        <p:style>
+          <a:lnRef idx="1">
+            <a:schemeClr val="accent1"/>
+          </a:lnRef>
+          <a:fillRef idx="0">
+            <a:schemeClr val="accent1"/>
+          </a:fillRef>
+          <a:effectRef idx="0">
+            <a:schemeClr val="accent1"/>
+          </a:effectRef>
+          <a:fontRef idx="minor">
+            <a:schemeClr val="tx1"/>
+          </a:fontRef>
+        </p:style>
+      </p:cxnSp>
+      <p:sp>
+        <p:nvSpPr>
+          <p:cNvPr id="90" name="TextBox 89"/>
+          <p:cNvSpPr txBox="1"/>
+          <p:nvPr/>
+        </p:nvSpPr>
+        <p:spPr>
+          <a:xfrm>
+            <a:off x="8558784" y="3401568"/>
+            <a:ext cx="354584" cy="523220"/>
+          </a:xfrm>
+          <a:prstGeom prst="rect">
+            <a:avLst/>
+          </a:prstGeom>
+          <a:noFill/>
+        </p:spPr>
+        <p:txBody>
+          <a:bodyPr wrap="none" rtlCol="0">
+            <a:spAutoFit/>
+          </a:bodyPr>
+          <a:lstStyle/>
+          <a:p>
+            <a:r>
+              <a:rPr lang="en-US" sz="2800" b="1" dirty="0" smtClean="0"/>
+              <a:t>|</a:t>
+            </a:r>
+            <a:endParaRPr lang="en-US" sz="2800" b="1" dirty="0"/>
+          </a:p>
+        </p:txBody>
+      </p:sp>
+      <p:cxnSp>
+        <p:nvCxnSpPr>
+          <p:cNvPr id="49" name="Curved Connector 48"/>
+          <p:cNvCxnSpPr>
+            <a:stCxn id="75" idx="6"/>
+            <a:endCxn id="29" idx="6"/>
+          </p:cNvCxnSpPr>
+          <p:nvPr/>
+        </p:nvCxnSpPr>
+        <p:spPr>
+          <a:xfrm>
+            <a:off x="10497312" y="2716505"/>
+            <a:ext cx="1" cy="3487569"/>
+          </a:xfrm>
+          <a:prstGeom prst="curvedConnector3">
+            <a:avLst>
+              <a:gd name="adj1" fmla="val 22860100000"/>
+            </a:avLst>
+          </a:prstGeom>
+          <a:ln w="25400">
+            <a:solidFill>
+              <a:schemeClr val="tx1"/>
+            </a:solidFill>
+            <a:tailEnd type="arrow" w="lg" len="lg"/>
+          </a:ln>
+        </p:spPr>
+        <p:style>
+          <a:lnRef idx="1">
+            <a:schemeClr val="accent1"/>
+          </a:lnRef>
+          <a:fillRef idx="0">
+            <a:schemeClr val="accent1"/>
+          </a:fillRef>
+          <a:effectRef idx="0">
+            <a:schemeClr val="accent1"/>
+          </a:effectRef>
+          <a:fontRef idx="minor">
+            <a:schemeClr val="tx1"/>
+          </a:fontRef>
+        </p:style>
+      </p:cxnSp>
+      <p:cxnSp>
+        <p:nvCxnSpPr>
+          <p:cNvPr id="93" name="Curved Connector 92"/>
+          <p:cNvCxnSpPr/>
+          <p:nvPr/>
+        </p:nvCxnSpPr>
+        <p:spPr>
+          <a:xfrm rot="5400000" flipH="1" flipV="1">
+            <a:off x="5845507" y="1664965"/>
+            <a:ext cx="12700" cy="1551788"/>
+          </a:xfrm>
+          <a:prstGeom prst="curvedConnector3">
+            <a:avLst>
+              <a:gd name="adj1" fmla="val 6941992"/>
+            </a:avLst>
+          </a:prstGeom>
+          <a:ln w="25400">
+            <a:solidFill>
+              <a:schemeClr val="tx1"/>
+            </a:solidFill>
+            <a:tailEnd type="arrow" w="lg" len="lg"/>
+          </a:ln>
+        </p:spPr>
+        <p:style>
+          <a:lnRef idx="1">
+            <a:schemeClr val="accent1"/>
+          </a:lnRef>
+          <a:fillRef idx="0">
+            <a:schemeClr val="accent1"/>
+          </a:fillRef>
+          <a:effectRef idx="0">
+            <a:schemeClr val="accent1"/>
+          </a:effectRef>
+          <a:fontRef idx="minor">
+            <a:schemeClr val="tx1"/>
+          </a:fontRef>
+        </p:style>
+      </p:cxnSp>
+      <p:cxnSp>
+        <p:nvCxnSpPr>
+          <p:cNvPr id="105" name="Curved Connector 104"/>
+          <p:cNvCxnSpPr>
+            <a:stCxn id="7" idx="4"/>
+            <a:endCxn id="29" idx="2"/>
+          </p:cNvCxnSpPr>
+          <p:nvPr/>
+        </p:nvCxnSpPr>
+        <p:spPr>
+          <a:xfrm rot="16200000" flipH="1">
+            <a:off x="4739457" y="2860234"/>
+            <a:ext cx="1235409" cy="5452269"/>
+          </a:xfrm>
+          <a:prstGeom prst="curvedConnector2">
+            <a:avLst/>
+          </a:prstGeom>
+          <a:ln w="25400">
+            <a:solidFill>
+              <a:schemeClr val="tx1"/>
+            </a:solidFill>
+            <a:tailEnd type="arrow" w="lg" len="lg"/>
+          </a:ln>
+        </p:spPr>
+        <p:style>
+          <a:lnRef idx="1">
+            <a:schemeClr val="accent1"/>
+          </a:lnRef>
+          <a:fillRef idx="0">
+            <a:schemeClr val="accent1"/>
+          </a:fillRef>
+          <a:effectRef idx="0">
+            <a:schemeClr val="accent1"/>
+          </a:effectRef>
+          <a:fontRef idx="minor">
+            <a:schemeClr val="tx1"/>
+          </a:fontRef>
+        </p:style>
+      </p:cxnSp>
+      <p:cxnSp>
+        <p:nvCxnSpPr>
+          <p:cNvPr id="109" name="Curved Connector 108"/>
+          <p:cNvCxnSpPr>
+            <a:stCxn id="69" idx="4"/>
+            <a:endCxn id="29" idx="2"/>
+          </p:cNvCxnSpPr>
+          <p:nvPr/>
+        </p:nvCxnSpPr>
+        <p:spPr>
+          <a:xfrm rot="16200000" flipH="1">
+            <a:off x="6403443" y="4524221"/>
+            <a:ext cx="1236842" cy="2122864"/>
+          </a:xfrm>
+          <a:prstGeom prst="curvedConnector2">
+            <a:avLst/>
+          </a:prstGeom>
+          <a:ln w="25400">
+            <a:solidFill>
+              <a:schemeClr val="tx1"/>
+            </a:solidFill>
+            <a:tailEnd type="arrow" w="lg" len="lg"/>
+          </a:ln>
+        </p:spPr>
+        <p:style>
+          <a:lnRef idx="1">
+            <a:schemeClr val="accent1"/>
+          </a:lnRef>
+          <a:fillRef idx="0">
+            <a:schemeClr val="accent1"/>
+          </a:fillRef>
+          <a:effectRef idx="0">
+            <a:schemeClr val="accent1"/>
+          </a:effectRef>
+          <a:fontRef idx="minor">
+            <a:schemeClr val="tx1"/>
+          </a:fontRef>
+        </p:style>
+      </p:cxnSp>
+      <p:sp>
+        <p:nvSpPr>
+          <p:cNvPr id="29" name="Oval 28"/>
+          <p:cNvSpPr>
+            <a:spLocks noChangeAspect="1"/>
+          </p:cNvSpPr>
+          <p:nvPr/>
+        </p:nvSpPr>
+        <p:spPr>
+          <a:xfrm>
+            <a:off x="8083296" y="5822913"/>
+            <a:ext cx="2414017" cy="762321"/>
+          </a:xfrm>
+          <a:prstGeom prst="ellipse">
+            <a:avLst/>
+          </a:prstGeom>
+          <a:noFill/>
+          <a:ln w="31750">
+            <a:solidFill>
+              <a:schemeClr val="tx1"/>
+            </a:solidFill>
+          </a:ln>
+        </p:spPr>
+        <p:style>
+          <a:lnRef idx="2">
+            <a:schemeClr val="accent1">
+              <a:shade val="50000"/>
+            </a:schemeClr>
+          </a:lnRef>
+          <a:fillRef idx="1">
+            <a:schemeClr val="accent1"/>
+          </a:fillRef>
+          <a:effectRef idx="0">
+            <a:schemeClr val="accent1"/>
+          </a:effectRef>
+          <a:fontRef idx="minor">
+            <a:schemeClr val="lt1"/>
+          </a:fontRef>
+        </p:style>
+        <p:txBody>
+          <a:bodyPr rtlCol="0" anchor="ctr"/>
+          <a:lstStyle/>
+          <a:p>
+            <a:pPr algn="ctr"/>
+            <a:endParaRPr lang="en-US" dirty="0">
+              <a:solidFill>
+                <a:schemeClr val="tx1"/>
+              </a:solidFill>
+            </a:endParaRPr>
+          </a:p>
+        </p:txBody>
+      </p:sp>
+    </p:spTree>
+    <p:extLst>
+      <p:ext uri="{BB962C8B-B14F-4D97-AF65-F5344CB8AC3E}">
+        <p14:creationId xmlns:p14="http://schemas.microsoft.com/office/powerpoint/2010/main" val="927501588"/>
       </p:ext>
     </p:extLst>
   </p:cSld>

</xml_diff>